<commit_message>
New Branding with safe&surg
Check the Brand Design folder for drafts - switch by replacing the logos in the img folder
</commit_message>
<xml_diff>
--- a/Brand Design/Logo.pptx
+++ b/Brand Design/Logo.pptx
@@ -129,7 +129,7 @@
 <file path=ppt/revisionInfo.xml><?xml version="1.0" encoding="utf-8"?>
 <p1510:revInfo xmlns:a="http://schemas.openxmlformats.org/drawingml/2006/main" xmlns:r="http://schemas.openxmlformats.org/officeDocument/2006/relationships" xmlns:p1510="http://schemas.microsoft.com/office/powerpoint/2015/10/main">
   <p1510:revLst>
-    <p1510:client id="{DB9C9AFF-A5D0-4761-A34D-2E3DBE0A3942}" v="21" dt="2021-01-19T10:40:53.901"/>
+    <p1510:client id="{DB9C9AFF-A5D0-4761-A34D-2E3DBE0A3942}" v="25" dt="2021-01-19T10:47:32.406"/>
   </p1510:revLst>
 </p1510:revInfo>
 </file>
@@ -139,12 +139,12 @@
   <pc:docChgLst>
     <pc:chgData name="Lars Masanneck" userId="a768fb6d85de1e2f" providerId="LiveId" clId="{DB9C9AFF-A5D0-4761-A34D-2E3DBE0A3942}"/>
     <pc:docChg chg="undo custSel mod addSld modSld">
-      <pc:chgData name="Lars Masanneck" userId="a768fb6d85de1e2f" providerId="LiveId" clId="{DB9C9AFF-A5D0-4761-A34D-2E3DBE0A3942}" dt="2021-01-19T10:40:53.901" v="126" actId="164"/>
+      <pc:chgData name="Lars Masanneck" userId="a768fb6d85de1e2f" providerId="LiveId" clId="{DB9C9AFF-A5D0-4761-A34D-2E3DBE0A3942}" dt="2021-01-19T10:47:43.219" v="136" actId="1076"/>
       <pc:docMkLst>
         <pc:docMk/>
       </pc:docMkLst>
       <pc:sldChg chg="addSp delSp modSp new mod setBg">
-        <pc:chgData name="Lars Masanneck" userId="a768fb6d85de1e2f" providerId="LiveId" clId="{DB9C9AFF-A5D0-4761-A34D-2E3DBE0A3942}" dt="2021-01-19T10:29:54.934" v="107" actId="1076"/>
+        <pc:chgData name="Lars Masanneck" userId="a768fb6d85de1e2f" providerId="LiveId" clId="{DB9C9AFF-A5D0-4761-A34D-2E3DBE0A3942}" dt="2021-01-19T10:46:55.689" v="133" actId="164"/>
         <pc:sldMkLst>
           <pc:docMk/>
           <pc:sldMk cId="3482249449" sldId="256"/>
@@ -165,8 +165,8 @@
             <ac:spMk id="3" creationId="{D37A1BF8-7DDE-43C3-B64F-80FE51F7599E}"/>
           </ac:spMkLst>
         </pc:spChg>
-        <pc:spChg chg="add mod">
-          <ac:chgData name="Lars Masanneck" userId="a768fb6d85de1e2f" providerId="LiveId" clId="{DB9C9AFF-A5D0-4761-A34D-2E3DBE0A3942}" dt="2021-01-19T10:19:23.278" v="81" actId="164"/>
+        <pc:spChg chg="add mod topLvl">
+          <ac:chgData name="Lars Masanneck" userId="a768fb6d85de1e2f" providerId="LiveId" clId="{DB9C9AFF-A5D0-4761-A34D-2E3DBE0A3942}" dt="2021-01-19T10:46:55.689" v="133" actId="164"/>
           <ac:spMkLst>
             <pc:docMk/>
             <pc:sldMk cId="3482249449" sldId="256"/>
@@ -197,8 +197,8 @@
             <ac:spMk id="12" creationId="{D1D22B31-BF8F-446B-9009-8A251FB177CB}"/>
           </ac:spMkLst>
         </pc:spChg>
-        <pc:spChg chg="add mod">
-          <ac:chgData name="Lars Masanneck" userId="a768fb6d85de1e2f" providerId="LiveId" clId="{DB9C9AFF-A5D0-4761-A34D-2E3DBE0A3942}" dt="2021-01-19T10:29:54.934" v="107" actId="1076"/>
+        <pc:spChg chg="add mod topLvl">
+          <ac:chgData name="Lars Masanneck" userId="a768fb6d85de1e2f" providerId="LiveId" clId="{DB9C9AFF-A5D0-4761-A34D-2E3DBE0A3942}" dt="2021-01-19T10:46:55.689" v="133" actId="164"/>
           <ac:spMkLst>
             <pc:docMk/>
             <pc:sldMk cId="3482249449" sldId="256"/>
@@ -213,8 +213,8 @@
             <ac:spMk id="16" creationId="{ADAD1991-FFD1-4E94-ABAB-7560D33008E4}"/>
           </ac:spMkLst>
         </pc:spChg>
-        <pc:spChg chg="add mod">
-          <ac:chgData name="Lars Masanneck" userId="a768fb6d85de1e2f" providerId="LiveId" clId="{DB9C9AFF-A5D0-4761-A34D-2E3DBE0A3942}" dt="2021-01-19T10:29:35.643" v="105" actId="1076"/>
+        <pc:spChg chg="add mod topLvl">
+          <ac:chgData name="Lars Masanneck" userId="a768fb6d85de1e2f" providerId="LiveId" clId="{DB9C9AFF-A5D0-4761-A34D-2E3DBE0A3942}" dt="2021-01-19T10:46:55.689" v="133" actId="164"/>
           <ac:spMkLst>
             <pc:docMk/>
             <pc:sldMk cId="3482249449" sldId="256"/>
@@ -254,13 +254,29 @@
           </ac:spMkLst>
         </pc:spChg>
         <pc:grpChg chg="add mod">
-          <ac:chgData name="Lars Masanneck" userId="a768fb6d85de1e2f" providerId="LiveId" clId="{DB9C9AFF-A5D0-4761-A34D-2E3DBE0A3942}" dt="2021-01-19T10:28:36.710" v="102" actId="26606"/>
+          <ac:chgData name="Lars Masanneck" userId="a768fb6d85de1e2f" providerId="LiveId" clId="{DB9C9AFF-A5D0-4761-A34D-2E3DBE0A3942}" dt="2021-01-19T10:46:55.689" v="133" actId="164"/>
+          <ac:grpSpMkLst>
+            <pc:docMk/>
+            <pc:sldMk cId="3482249449" sldId="256"/>
+            <ac:grpSpMk id="4" creationId="{E3040C1B-F29D-4C4A-98DA-53A418CA1816}"/>
+          </ac:grpSpMkLst>
+        </pc:grpChg>
+        <pc:grpChg chg="add del mod">
+          <ac:chgData name="Lars Masanneck" userId="a768fb6d85de1e2f" providerId="LiveId" clId="{DB9C9AFF-A5D0-4761-A34D-2E3DBE0A3942}" dt="2021-01-19T10:44:33.058" v="127" actId="165"/>
           <ac:grpSpMkLst>
             <pc:docMk/>
             <pc:sldMk cId="3482249449" sldId="256"/>
             <ac:grpSpMk id="11" creationId="{2CF379EA-55BA-47B6-ABC8-ED749EAB1D06}"/>
           </ac:grpSpMkLst>
         </pc:grpChg>
+        <pc:picChg chg="add mod">
+          <ac:chgData name="Lars Masanneck" userId="a768fb6d85de1e2f" providerId="LiveId" clId="{DB9C9AFF-A5D0-4761-A34D-2E3DBE0A3942}" dt="2021-01-19T10:46:55.689" v="133" actId="164"/>
+          <ac:picMkLst>
+            <pc:docMk/>
+            <pc:sldMk cId="3482249449" sldId="256"/>
+            <ac:picMk id="3" creationId="{DD7A670F-1813-4520-B913-390C316ECBCA}"/>
+          </ac:picMkLst>
+        </pc:picChg>
         <pc:picChg chg="add del mod">
           <ac:chgData name="Lars Masanneck" userId="a768fb6d85de1e2f" providerId="LiveId" clId="{DB9C9AFF-A5D0-4761-A34D-2E3DBE0A3942}" dt="2021-01-19T10:10:26.324" v="9" actId="478"/>
           <ac:picMkLst>
@@ -269,8 +285,8 @@
             <ac:picMk id="5" creationId="{FFE7A890-A2F8-4C17-85BA-203F948952A8}"/>
           </ac:picMkLst>
         </pc:picChg>
-        <pc:picChg chg="add mod ord">
-          <ac:chgData name="Lars Masanneck" userId="a768fb6d85de1e2f" providerId="LiveId" clId="{DB9C9AFF-A5D0-4761-A34D-2E3DBE0A3942}" dt="2021-01-19T10:29:41.095" v="106" actId="1076"/>
+        <pc:picChg chg="add mod ord topLvl modCrop">
+          <ac:chgData name="Lars Masanneck" userId="a768fb6d85de1e2f" providerId="LiveId" clId="{DB9C9AFF-A5D0-4761-A34D-2E3DBE0A3942}" dt="2021-01-19T10:46:55.689" v="133" actId="164"/>
           <ac:picMkLst>
             <pc:docMk/>
             <pc:sldMk cId="3482249449" sldId="256"/>
@@ -493,7 +509,7 @@
         </pc:picChg>
       </pc:sldChg>
       <pc:sldChg chg="addSp delSp modSp new mod">
-        <pc:chgData name="Lars Masanneck" userId="a768fb6d85de1e2f" providerId="LiveId" clId="{DB9C9AFF-A5D0-4761-A34D-2E3DBE0A3942}" dt="2021-01-19T10:40:53.901" v="126" actId="164"/>
+        <pc:chgData name="Lars Masanneck" userId="a768fb6d85de1e2f" providerId="LiveId" clId="{DB9C9AFF-A5D0-4761-A34D-2E3DBE0A3942}" dt="2021-01-19T10:47:43.219" v="136" actId="1076"/>
         <pc:sldMkLst>
           <pc:docMk/>
           <pc:sldMk cId="1344901502" sldId="259"/>
@@ -515,11 +531,35 @@
           </ac:spMkLst>
         </pc:spChg>
         <pc:spChg chg="mod ord topLvl">
-          <ac:chgData name="Lars Masanneck" userId="a768fb6d85de1e2f" providerId="LiveId" clId="{DB9C9AFF-A5D0-4761-A34D-2E3DBE0A3942}" dt="2021-01-19T10:40:53.901" v="126" actId="164"/>
+          <ac:chgData name="Lars Masanneck" userId="a768fb6d85de1e2f" providerId="LiveId" clId="{DB9C9AFF-A5D0-4761-A34D-2E3DBE0A3942}" dt="2021-01-19T10:47:31.092" v="134" actId="478"/>
           <ac:spMkLst>
             <pc:docMk/>
             <pc:sldMk cId="1344901502" sldId="259"/>
             <ac:spMk id="6" creationId="{DC2C28BB-8ED2-41AC-9DE9-11B524633175}"/>
+          </ac:spMkLst>
+        </pc:spChg>
+        <pc:spChg chg="mod">
+          <ac:chgData name="Lars Masanneck" userId="a768fb6d85de1e2f" providerId="LiveId" clId="{DB9C9AFF-A5D0-4761-A34D-2E3DBE0A3942}" dt="2021-01-19T10:47:32.406" v="135"/>
+          <ac:spMkLst>
+            <pc:docMk/>
+            <pc:sldMk cId="1344901502" sldId="259"/>
+            <ac:spMk id="10" creationId="{BA0DD5BB-5C65-40D8-8030-CA678C71520D}"/>
+          </ac:spMkLst>
+        </pc:spChg>
+        <pc:spChg chg="mod">
+          <ac:chgData name="Lars Masanneck" userId="a768fb6d85de1e2f" providerId="LiveId" clId="{DB9C9AFF-A5D0-4761-A34D-2E3DBE0A3942}" dt="2021-01-19T10:47:32.406" v="135"/>
+          <ac:spMkLst>
+            <pc:docMk/>
+            <pc:sldMk cId="1344901502" sldId="259"/>
+            <ac:spMk id="11" creationId="{C0C482CC-DCCE-413E-BE55-3B56F1EA513D}"/>
+          </ac:spMkLst>
+        </pc:spChg>
+        <pc:spChg chg="mod">
+          <ac:chgData name="Lars Masanneck" userId="a768fb6d85de1e2f" providerId="LiveId" clId="{DB9C9AFF-A5D0-4761-A34D-2E3DBE0A3942}" dt="2021-01-19T10:47:32.406" v="135"/>
+          <ac:spMkLst>
+            <pc:docMk/>
+            <pc:sldMk cId="1344901502" sldId="259"/>
+            <ac:spMk id="12" creationId="{713F5328-B03C-41C2-A68D-5F63430BA12B}"/>
           </ac:spMkLst>
         </pc:spChg>
         <pc:grpChg chg="add del mod">
@@ -530,20 +570,44 @@
             <ac:grpSpMk id="4" creationId="{608DC807-9A58-4D97-B4E8-A8BE81E650DF}"/>
           </ac:grpSpMkLst>
         </pc:grpChg>
-        <pc:grpChg chg="add mod">
-          <ac:chgData name="Lars Masanneck" userId="a768fb6d85de1e2f" providerId="LiveId" clId="{DB9C9AFF-A5D0-4761-A34D-2E3DBE0A3942}" dt="2021-01-19T10:40:53.901" v="126" actId="164"/>
+        <pc:grpChg chg="add del mod">
+          <ac:chgData name="Lars Masanneck" userId="a768fb6d85de1e2f" providerId="LiveId" clId="{DB9C9AFF-A5D0-4761-A34D-2E3DBE0A3942}" dt="2021-01-19T10:47:31.092" v="134" actId="478"/>
           <ac:grpSpMkLst>
             <pc:docMk/>
             <pc:sldMk cId="1344901502" sldId="259"/>
             <ac:grpSpMk id="7" creationId="{D077B5F0-7E39-485E-955D-FF9BF8D7455C}"/>
           </ac:grpSpMkLst>
         </pc:grpChg>
-        <pc:picChg chg="mod topLvl">
-          <ac:chgData name="Lars Masanneck" userId="a768fb6d85de1e2f" providerId="LiveId" clId="{DB9C9AFF-A5D0-4761-A34D-2E3DBE0A3942}" dt="2021-01-19T10:40:53.901" v="126" actId="164"/>
+        <pc:grpChg chg="add mod">
+          <ac:chgData name="Lars Masanneck" userId="a768fb6d85de1e2f" providerId="LiveId" clId="{DB9C9AFF-A5D0-4761-A34D-2E3DBE0A3942}" dt="2021-01-19T10:47:43.219" v="136" actId="1076"/>
+          <ac:grpSpMkLst>
+            <pc:docMk/>
+            <pc:sldMk cId="1344901502" sldId="259"/>
+            <ac:grpSpMk id="8" creationId="{7FE49A27-70DF-418D-B408-3EE6549700BB}"/>
+          </ac:grpSpMkLst>
+        </pc:grpChg>
+        <pc:picChg chg="del mod topLvl">
+          <ac:chgData name="Lars Masanneck" userId="a768fb6d85de1e2f" providerId="LiveId" clId="{DB9C9AFF-A5D0-4761-A34D-2E3DBE0A3942}" dt="2021-01-19T10:47:31.092" v="134" actId="478"/>
           <ac:picMkLst>
             <pc:docMk/>
             <pc:sldMk cId="1344901502" sldId="259"/>
             <ac:picMk id="5" creationId="{686B5E1C-17CA-4279-8F00-50CA14E62B3B}"/>
+          </ac:picMkLst>
+        </pc:picChg>
+        <pc:picChg chg="mod">
+          <ac:chgData name="Lars Masanneck" userId="a768fb6d85de1e2f" providerId="LiveId" clId="{DB9C9AFF-A5D0-4761-A34D-2E3DBE0A3942}" dt="2021-01-19T10:47:32.406" v="135"/>
+          <ac:picMkLst>
+            <pc:docMk/>
+            <pc:sldMk cId="1344901502" sldId="259"/>
+            <ac:picMk id="9" creationId="{3B3254C7-1CE6-4DCC-8F2F-7B0E64CD8DC0}"/>
+          </ac:picMkLst>
+        </pc:picChg>
+        <pc:picChg chg="mod">
+          <ac:chgData name="Lars Masanneck" userId="a768fb6d85de1e2f" providerId="LiveId" clId="{DB9C9AFF-A5D0-4761-A34D-2E3DBE0A3942}" dt="2021-01-19T10:47:32.406" v="135"/>
+          <ac:picMkLst>
+            <pc:docMk/>
+            <pc:sldMk cId="1344901502" sldId="259"/>
+            <ac:picMk id="13" creationId="{412E4A0B-36B2-4B6B-9FFE-D56C546EC332}"/>
           </ac:picMkLst>
         </pc:picChg>
       </pc:sldChg>
@@ -6343,10 +6407,10 @@
       </p:sp>
       <p:grpSp>
         <p:nvGrpSpPr>
-          <p:cNvPr id="11" name="Gruppieren 10">
+          <p:cNvPr id="4" name="Gruppieren 3">
             <a:extLst>
               <a:ext uri="{FF2B5EF4-FFF2-40B4-BE49-F238E27FC236}">
-                <a16:creationId xmlns:a16="http://schemas.microsoft.com/office/drawing/2014/main" id="{2CF379EA-55BA-47B6-ABC8-ED749EAB1D06}"/>
+                <a16:creationId xmlns:a16="http://schemas.microsoft.com/office/drawing/2014/main" id="{E3040C1B-F29D-4C4A-98DA-53A418CA1816}"/>
               </a:ext>
             </a:extLst>
           </p:cNvPr>
@@ -6355,10 +6419,10 @@
         </p:nvGrpSpPr>
         <p:grpSpPr>
           <a:xfrm>
-            <a:off x="4562468" y="1820332"/>
-            <a:ext cx="3067064" cy="3495283"/>
-            <a:chOff x="4691147" y="1596789"/>
-            <a:chExt cx="2975958" cy="3391457"/>
+            <a:off x="4562468" y="2274670"/>
+            <a:ext cx="3067064" cy="3040945"/>
+            <a:chOff x="4562468" y="2274670"/>
+            <a:chExt cx="3067064" cy="3040945"/>
           </a:xfrm>
         </p:grpSpPr>
         <p:pic>
@@ -6375,7 +6439,7 @@
             </p:cNvPicPr>
             <p:nvPr/>
           </p:nvPicPr>
-          <p:blipFill>
+          <p:blipFill rotWithShape="1">
             <a:blip r:embed="rId2">
               <a:extLst>
                 <a:ext uri="{28A0092B-C50C-407E-A947-70E740481C1C}">
@@ -6386,14 +6450,13 @@
                 </a:ext>
               </a:extLst>
             </a:blip>
-            <a:stretch>
-              <a:fillRect/>
-            </a:stretch>
+            <a:srcRect t="43912"/>
+            <a:stretch/>
           </p:blipFill>
           <p:spPr>
             <a:xfrm>
-              <a:off x="4691147" y="1596789"/>
-              <a:ext cx="2975958" cy="2975958"/>
+              <a:off x="4562468" y="3167150"/>
+              <a:ext cx="3067064" cy="1720246"/>
             </a:xfrm>
             <a:prstGeom prst="rect">
               <a:avLst/>
@@ -6414,8 +6477,8 @@
           </p:nvSpPr>
           <p:spPr>
             <a:xfrm rot="18238185">
-              <a:off x="4895706" y="2808558"/>
-              <a:ext cx="808235" cy="923330"/>
+              <a:off x="4773289" y="3069198"/>
+              <a:ext cx="832978" cy="951597"/>
             </a:xfrm>
             <a:prstGeom prst="rect">
               <a:avLst/>
@@ -6459,8 +6522,8 @@
           </p:nvSpPr>
           <p:spPr>
             <a:xfrm rot="3541792">
-              <a:off x="6634283" y="2860747"/>
-              <a:ext cx="870688" cy="923330"/>
+              <a:off x="6565091" y="3122985"/>
+              <a:ext cx="897343" cy="951597"/>
             </a:xfrm>
             <a:prstGeom prst="rect">
               <a:avLst/>
@@ -6505,8 +6568,8 @@
           </p:nvSpPr>
           <p:spPr>
             <a:xfrm>
-              <a:off x="4837484" y="4157249"/>
-              <a:ext cx="2829621" cy="830997"/>
+              <a:off x="4713285" y="4459178"/>
+              <a:ext cx="2916247" cy="856437"/>
             </a:xfrm>
             <a:prstGeom prst="rect">
               <a:avLst/>
@@ -6537,6 +6600,45 @@
             </a:p>
           </p:txBody>
         </p:sp>
+        <p:pic>
+          <p:nvPicPr>
+            <p:cNvPr id="3" name="Grafik 2" descr="Feuer mit einfarbiger Füllung">
+              <a:extLst>
+                <a:ext uri="{FF2B5EF4-FFF2-40B4-BE49-F238E27FC236}">
+                  <a16:creationId xmlns:a16="http://schemas.microsoft.com/office/drawing/2014/main" id="{DD7A670F-1813-4520-B913-390C316ECBCA}"/>
+                </a:ext>
+              </a:extLst>
+            </p:cNvPr>
+            <p:cNvPicPr>
+              <a:picLocks noChangeAspect="1"/>
+            </p:cNvPicPr>
+            <p:nvPr/>
+          </p:nvPicPr>
+          <p:blipFill>
+            <a:blip r:embed="rId4">
+              <a:extLst>
+                <a:ext uri="{28A0092B-C50C-407E-A947-70E740481C1C}">
+                  <a14:useLocalDpi xmlns:a14="http://schemas.microsoft.com/office/drawing/2010/main" val="0"/>
+                </a:ext>
+                <a:ext uri="{96DAC541-7B7A-43D3-8B79-37D633B846F1}">
+                  <asvg:svgBlip xmlns:asvg="http://schemas.microsoft.com/office/drawing/2016/SVG/main" r:embed="rId5"/>
+                </a:ext>
+              </a:extLst>
+            </a:blip>
+            <a:stretch>
+              <a:fillRect/>
+            </a:stretch>
+          </p:blipFill>
+          <p:spPr>
+            <a:xfrm>
+              <a:off x="5649885" y="2274670"/>
+              <a:ext cx="914400" cy="914400"/>
+            </a:xfrm>
+            <a:prstGeom prst="rect">
+              <a:avLst/>
+            </a:prstGeom>
+          </p:spPr>
+        </p:pic>
       </p:grpSp>
     </p:spTree>
     <p:extLst>
@@ -7043,12 +7145,74 @@
           <a:chExt cx="0" cy="0"/>
         </a:xfrm>
       </p:grpSpPr>
+      <p:sp>
+        <p:nvSpPr>
+          <p:cNvPr id="6" name="Ellipse 5">
+            <a:extLst>
+              <a:ext uri="{FF2B5EF4-FFF2-40B4-BE49-F238E27FC236}">
+                <a16:creationId xmlns:a16="http://schemas.microsoft.com/office/drawing/2014/main" id="{DC2C28BB-8ED2-41AC-9DE9-11B524633175}"/>
+              </a:ext>
+            </a:extLst>
+          </p:cNvPr>
+          <p:cNvSpPr/>
+          <p:nvPr/>
+        </p:nvSpPr>
+        <p:spPr>
+          <a:xfrm>
+            <a:off x="3968563" y="1247775"/>
+            <a:ext cx="4362450" cy="4362450"/>
+          </a:xfrm>
+          <a:prstGeom prst="ellipse">
+            <a:avLst/>
+          </a:prstGeom>
+          <a:solidFill>
+            <a:schemeClr val="bg1"/>
+          </a:solidFill>
+          <a:ln w="76200" cap="flat" cmpd="sng" algn="ctr">
+            <a:solidFill>
+              <a:schemeClr val="accent1"/>
+            </a:solidFill>
+            <a:prstDash val="solid"/>
+            <a:round/>
+            <a:headEnd type="none" w="med" len="med"/>
+            <a:tailEnd type="none" w="med" len="med"/>
+          </a:ln>
+        </p:spPr>
+        <p:style>
+          <a:lnRef idx="0">
+            <a:scrgbClr r="0" g="0" b="0"/>
+          </a:lnRef>
+          <a:fillRef idx="0">
+            <a:scrgbClr r="0" g="0" b="0"/>
+          </a:fillRef>
+          <a:effectRef idx="0">
+            <a:scrgbClr r="0" g="0" b="0"/>
+          </a:effectRef>
+          <a:fontRef idx="minor">
+            <a:schemeClr val="accent1"/>
+          </a:fontRef>
+        </p:style>
+        <p:txBody>
+          <a:bodyPr rtlCol="0" anchor="ctr"/>
+          <a:lstStyle/>
+          <a:p>
+            <a:pPr algn="ctr"/>
+            <a:endParaRPr lang="en-DE" dirty="0">
+              <a:ln w="76200">
+                <a:solidFill>
+                  <a:schemeClr val="tx1"/>
+                </a:solidFill>
+              </a:ln>
+            </a:endParaRPr>
+          </a:p>
+        </p:txBody>
+      </p:sp>
       <p:grpSp>
         <p:nvGrpSpPr>
-          <p:cNvPr id="7" name="Gruppieren 6">
+          <p:cNvPr id="8" name="Gruppieren 7">
             <a:extLst>
               <a:ext uri="{FF2B5EF4-FFF2-40B4-BE49-F238E27FC236}">
-                <a16:creationId xmlns:a16="http://schemas.microsoft.com/office/drawing/2014/main" id="{D077B5F0-7E39-485E-955D-FF9BF8D7455C}"/>
+                <a16:creationId xmlns:a16="http://schemas.microsoft.com/office/drawing/2014/main" id="{7FE49A27-70DF-418D-B408-3EE6549700BB}"/>
               </a:ext>
             </a:extLst>
           </p:cNvPr>
@@ -7057,18 +7221,147 @@
         </p:nvGrpSpPr>
         <p:grpSpPr>
           <a:xfrm>
-            <a:off x="3968563" y="1247775"/>
-            <a:ext cx="4362450" cy="4362450"/>
-            <a:chOff x="3968563" y="1247775"/>
-            <a:chExt cx="4362450" cy="4362450"/>
+            <a:off x="4616256" y="1800844"/>
+            <a:ext cx="3067064" cy="3040945"/>
+            <a:chOff x="4562468" y="2274670"/>
+            <a:chExt cx="3067064" cy="3040945"/>
           </a:xfrm>
         </p:grpSpPr>
+        <p:pic>
+          <p:nvPicPr>
+            <p:cNvPr id="9" name="Grafik 8" descr="Vulkan Silhouette">
+              <a:extLst>
+                <a:ext uri="{FF2B5EF4-FFF2-40B4-BE49-F238E27FC236}">
+                  <a16:creationId xmlns:a16="http://schemas.microsoft.com/office/drawing/2014/main" id="{3B3254C7-1CE6-4DCC-8F2F-7B0E64CD8DC0}"/>
+                </a:ext>
+              </a:extLst>
+            </p:cNvPr>
+            <p:cNvPicPr>
+              <a:picLocks noChangeAspect="1"/>
+            </p:cNvPicPr>
+            <p:nvPr/>
+          </p:nvPicPr>
+          <p:blipFill rotWithShape="1">
+            <a:blip r:embed="rId2">
+              <a:extLst>
+                <a:ext uri="{28A0092B-C50C-407E-A947-70E740481C1C}">
+                  <a14:useLocalDpi xmlns:a14="http://schemas.microsoft.com/office/drawing/2010/main" val="0"/>
+                </a:ext>
+                <a:ext uri="{96DAC541-7B7A-43D3-8B79-37D633B846F1}">
+                  <asvg:svgBlip xmlns:asvg="http://schemas.microsoft.com/office/drawing/2016/SVG/main" r:embed="rId3"/>
+                </a:ext>
+              </a:extLst>
+            </a:blip>
+            <a:srcRect t="43912"/>
+            <a:stretch/>
+          </p:blipFill>
+          <p:spPr>
+            <a:xfrm>
+              <a:off x="4562468" y="3167150"/>
+              <a:ext cx="3067064" cy="1720246"/>
+            </a:xfrm>
+            <a:prstGeom prst="rect">
+              <a:avLst/>
+            </a:prstGeom>
+          </p:spPr>
+        </p:pic>
         <p:sp>
           <p:nvSpPr>
-            <p:cNvPr id="6" name="Ellipse 5">
+            <p:cNvPr id="10" name="Rechteck 9">
               <a:extLst>
                 <a:ext uri="{FF2B5EF4-FFF2-40B4-BE49-F238E27FC236}">
-                  <a16:creationId xmlns:a16="http://schemas.microsoft.com/office/drawing/2014/main" id="{DC2C28BB-8ED2-41AC-9DE9-11B524633175}"/>
+                  <a16:creationId xmlns:a16="http://schemas.microsoft.com/office/drawing/2014/main" id="{BA0DD5BB-5C65-40D8-8030-CA678C71520D}"/>
+                </a:ext>
+              </a:extLst>
+            </p:cNvPr>
+            <p:cNvSpPr/>
+            <p:nvPr/>
+          </p:nvSpPr>
+          <p:spPr>
+            <a:xfrm rot="18238185">
+              <a:off x="4773289" y="3069198"/>
+              <a:ext cx="832978" cy="951597"/>
+            </a:xfrm>
+            <a:prstGeom prst="rect">
+              <a:avLst/>
+            </a:prstGeom>
+            <a:noFill/>
+          </p:spPr>
+          <p:txBody>
+            <a:bodyPr wrap="none" lIns="91440" tIns="45720" rIns="91440" bIns="45720">
+              <a:normAutofit/>
+            </a:bodyPr>
+            <a:lstStyle/>
+            <a:p>
+              <a:pPr algn="ctr">
+                <a:spcAft>
+                  <a:spcPts val="600"/>
+                </a:spcAft>
+              </a:pPr>
+              <a:r>
+                <a:rPr lang="de-DE" sz="5000" b="0" cap="none" spc="0" dirty="0">
+                  <a:ln w="0"/>
+                  <a:solidFill>
+                    <a:schemeClr val="accent1"/>
+                  </a:solidFill>
+                </a:rPr>
+                <a:t>La</a:t>
+              </a:r>
+            </a:p>
+          </p:txBody>
+        </p:sp>
+        <p:sp>
+          <p:nvSpPr>
+            <p:cNvPr id="11" name="Rechteck 10">
+              <a:extLst>
+                <a:ext uri="{FF2B5EF4-FFF2-40B4-BE49-F238E27FC236}">
+                  <a16:creationId xmlns:a16="http://schemas.microsoft.com/office/drawing/2014/main" id="{C0C482CC-DCCE-413E-BE55-3B56F1EA513D}"/>
+                </a:ext>
+              </a:extLst>
+            </p:cNvPr>
+            <p:cNvSpPr/>
+            <p:nvPr/>
+          </p:nvSpPr>
+          <p:spPr>
+            <a:xfrm rot="3541792">
+              <a:off x="6565091" y="3122985"/>
+              <a:ext cx="897343" cy="951597"/>
+            </a:xfrm>
+            <a:prstGeom prst="rect">
+              <a:avLst/>
+            </a:prstGeom>
+            <a:noFill/>
+          </p:spPr>
+          <p:txBody>
+            <a:bodyPr wrap="none" lIns="91440" tIns="45720" rIns="91440" bIns="45720">
+              <a:normAutofit/>
+            </a:bodyPr>
+            <a:lstStyle/>
+            <a:p>
+              <a:pPr algn="ctr">
+                <a:spcAft>
+                  <a:spcPts val="600"/>
+                </a:spcAft>
+              </a:pPr>
+              <a:r>
+                <a:rPr lang="de-DE" sz="5000" b="0" cap="none" spc="0" dirty="0">
+                  <a:ln w="0"/>
+                  <a:solidFill>
+                    <a:schemeClr val="accent1"/>
+                  </a:solidFill>
+                  <a:latin typeface="Myriad Pro" panose="020B0503030403020204" pitchFamily="34" charset="0"/>
+                </a:rPr>
+                <a:t>Va</a:t>
+              </a:r>
+            </a:p>
+          </p:txBody>
+        </p:sp>
+        <p:sp>
+          <p:nvSpPr>
+            <p:cNvPr id="12" name="Rechteck 11">
+              <a:extLst>
+                <a:ext uri="{FF2B5EF4-FFF2-40B4-BE49-F238E27FC236}">
+                  <a16:creationId xmlns:a16="http://schemas.microsoft.com/office/drawing/2014/main" id="{713F5328-B03C-41C2-A68D-5F63430BA12B}"/>
                 </a:ext>
               </a:extLst>
             </p:cNvPr>
@@ -7077,60 +7370,44 @@
           </p:nvSpPr>
           <p:spPr>
             <a:xfrm>
-              <a:off x="3968563" y="1247775"/>
-              <a:ext cx="4362450" cy="4362450"/>
+              <a:off x="4713285" y="4459178"/>
+              <a:ext cx="2916247" cy="856437"/>
             </a:xfrm>
-            <a:prstGeom prst="ellipse">
+            <a:prstGeom prst="rect">
               <a:avLst/>
             </a:prstGeom>
-            <a:solidFill>
-              <a:schemeClr val="bg1"/>
-            </a:solidFill>
-            <a:ln w="76200" cap="flat" cmpd="sng" algn="ctr">
-              <a:solidFill>
-                <a:schemeClr val="accent1"/>
-              </a:solidFill>
-              <a:prstDash val="solid"/>
-              <a:round/>
-              <a:headEnd type="none" w="med" len="med"/>
-              <a:tailEnd type="none" w="med" len="med"/>
-            </a:ln>
+            <a:noFill/>
           </p:spPr>
-          <p:style>
-            <a:lnRef idx="0">
-              <a:scrgbClr r="0" g="0" b="0"/>
-            </a:lnRef>
-            <a:fillRef idx="0">
-              <a:scrgbClr r="0" g="0" b="0"/>
-            </a:fillRef>
-            <a:effectRef idx="0">
-              <a:scrgbClr r="0" g="0" b="0"/>
-            </a:effectRef>
-            <a:fontRef idx="minor">
-              <a:schemeClr val="accent1"/>
-            </a:fontRef>
-          </p:style>
           <p:txBody>
-            <a:bodyPr rtlCol="0" anchor="ctr"/>
+            <a:bodyPr wrap="none" lIns="91440" tIns="45720" rIns="91440" bIns="45720">
+              <a:normAutofit/>
+            </a:bodyPr>
             <a:lstStyle/>
             <a:p>
-              <a:pPr algn="ctr"/>
-              <a:endParaRPr lang="en-DE" dirty="0">
-                <a:ln w="76200">
+              <a:pPr algn="ctr">
+                <a:spcAft>
+                  <a:spcPts val="600"/>
+                </a:spcAft>
+              </a:pPr>
+              <a:r>
+                <a:rPr lang="de-DE" sz="5000" b="0" cap="none" spc="0" dirty="0">
+                  <a:ln w="0"/>
                   <a:solidFill>
-                    <a:schemeClr val="tx1"/>
+                    <a:schemeClr val="accent1"/>
                   </a:solidFill>
-                </a:ln>
-              </a:endParaRPr>
+                  <a:latin typeface="Myriad Pro" panose="020B0503030403020204" pitchFamily="34" charset="0"/>
+                </a:rPr>
+                <a:t>Consulting</a:t>
+              </a:r>
             </a:p>
           </p:txBody>
         </p:sp>
         <p:pic>
           <p:nvPicPr>
-            <p:cNvPr id="5" name="Grafik 4">
+            <p:cNvPr id="13" name="Grafik 12" descr="Feuer mit einfarbiger Füllung">
               <a:extLst>
                 <a:ext uri="{FF2B5EF4-FFF2-40B4-BE49-F238E27FC236}">
-                  <a16:creationId xmlns:a16="http://schemas.microsoft.com/office/drawing/2014/main" id="{686B5E1C-17CA-4279-8F00-50CA14E62B3B}"/>
+                  <a16:creationId xmlns:a16="http://schemas.microsoft.com/office/drawing/2014/main" id="{412E4A0B-36B2-4B6B-9FFE-D56C546EC332}"/>
                 </a:ext>
               </a:extLst>
             </p:cNvPr>
@@ -7140,20 +7417,24 @@
             <p:nvPr/>
           </p:nvPicPr>
           <p:blipFill>
-            <a:blip r:embed="rId2">
+            <a:blip r:embed="rId4">
               <a:extLst>
                 <a:ext uri="{28A0092B-C50C-407E-A947-70E740481C1C}">
                   <a14:useLocalDpi xmlns:a14="http://schemas.microsoft.com/office/drawing/2010/main" val="0"/>
                 </a:ext>
+                <a:ext uri="{96DAC541-7B7A-43D3-8B79-37D633B846F1}">
+                  <asvg:svgBlip xmlns:asvg="http://schemas.microsoft.com/office/drawing/2016/SVG/main" r:embed="rId5"/>
+                </a:ext>
               </a:extLst>
             </a:blip>
-            <a:srcRect/>
-            <a:stretch/>
+            <a:stretch>
+              <a:fillRect/>
+            </a:stretch>
           </p:blipFill>
           <p:spPr>
             <a:xfrm>
-              <a:off x="4381989" y="1600041"/>
-              <a:ext cx="3535598" cy="3657917"/>
+              <a:off x="5649885" y="2274670"/>
+              <a:ext cx="914400" cy="914400"/>
             </a:xfrm>
             <a:prstGeom prst="rect">
               <a:avLst/>

</xml_diff>